<commit_message>
added source control to slides
</commit_message>
<xml_diff>
--- a/Docker for Development and Production.pptx
+++ b/Docker for Development and Production.pptx
@@ -5,7 +5,7 @@
     <p:sldMasterId id="2147483681" r:id="rId1"/>
   </p:sldMasterIdLst>
   <p:notesMasterIdLst>
-    <p:notesMasterId r:id="rId8"/>
+    <p:notesMasterId r:id="rId9"/>
   </p:notesMasterIdLst>
   <p:sldIdLst>
     <p:sldId id="256" r:id="rId2"/>
@@ -13,7 +13,8 @@
     <p:sldId id="258" r:id="rId4"/>
     <p:sldId id="259" r:id="rId5"/>
     <p:sldId id="272" r:id="rId6"/>
-    <p:sldId id="270" r:id="rId7"/>
+    <p:sldId id="273" r:id="rId7"/>
+    <p:sldId id="270" r:id="rId8"/>
   </p:sldIdLst>
   <p:sldSz cx="12192000" cy="6858000"/>
   <p:notesSz cx="6858000" cy="9144000"/>
@@ -202,7 +203,7 @@
           <a:p>
             <a:fld id="{4A45A9CA-CAD3-482E-9F3C-ADA3C01661C7}" type="datetimeFigureOut">
               <a:rPr lang="en-US"/>
-              <a:t>3/29/2018</a:t>
+              <a:t>3/30/2018</a:t>
             </a:fld>
             <a:endParaRPr lang="en-US"/>
           </a:p>
@@ -790,7 +791,7 @@
           <a:p>
             <a:fld id="{8029DFAB-0F8D-4F82-82F6-68530263C89A}" type="slidenum">
               <a:rPr lang="en-US"/>
-              <a:t>6</a:t>
+              <a:t>7</a:t>
             </a:fld>
             <a:endParaRPr lang="en-US"/>
           </a:p>
@@ -1035,7 +1036,7 @@
           <a:p>
             <a:fld id="{48A87A34-81AB-432B-8DAE-1953F412C126}" type="datetimeFigureOut">
               <a:rPr lang="en-US" smtClean="0"/>
-              <a:t>3/29/2018</a:t>
+              <a:t>3/30/2018</a:t>
             </a:fld>
             <a:endParaRPr lang="en-US" dirty="0"/>
           </a:p>
@@ -1243,7 +1244,7 @@
           <a:p>
             <a:fld id="{48A87A34-81AB-432B-8DAE-1953F412C126}" type="datetimeFigureOut">
               <a:rPr lang="en-US" smtClean="0"/>
-              <a:t>3/29/2018</a:t>
+              <a:t>3/30/2018</a:t>
             </a:fld>
             <a:endParaRPr lang="en-US" dirty="0"/>
           </a:p>
@@ -1500,7 +1501,7 @@
             <a:fld id="{48A87A34-81AB-432B-8DAE-1953F412C126}" type="datetimeFigureOut">
               <a:rPr lang="en-US" smtClean="0"/>
               <a:pPr/>
-              <a:t>3/29/2018</a:t>
+              <a:t>3/30/2018</a:t>
             </a:fld>
             <a:endParaRPr lang="en-US" dirty="0"/>
           </a:p>
@@ -1670,7 +1671,7 @@
           <a:p>
             <a:fld id="{48A87A34-81AB-432B-8DAE-1953F412C126}" type="datetimeFigureOut">
               <a:rPr lang="en-US" smtClean="0"/>
-              <a:t>3/29/2018</a:t>
+              <a:t>3/30/2018</a:t>
             </a:fld>
             <a:endParaRPr lang="en-US" dirty="0"/>
           </a:p>
@@ -2014,7 +2015,7 @@
             <a:fld id="{48A87A34-81AB-432B-8DAE-1953F412C126}" type="datetimeFigureOut">
               <a:rPr lang="en-US" smtClean="0"/>
               <a:pPr/>
-              <a:t>3/29/2018</a:t>
+              <a:t>3/30/2018</a:t>
             </a:fld>
             <a:endParaRPr lang="en-US" dirty="0"/>
           </a:p>
@@ -2289,7 +2290,7 @@
           <a:p>
             <a:fld id="{48A87A34-81AB-432B-8DAE-1953F412C126}" type="datetimeFigureOut">
               <a:rPr lang="en-US" smtClean="0"/>
-              <a:t>3/29/2018</a:t>
+              <a:t>3/30/2018</a:t>
             </a:fld>
             <a:endParaRPr lang="en-US" dirty="0"/>
           </a:p>
@@ -2668,7 +2669,7 @@
           <a:p>
             <a:fld id="{48A87A34-81AB-432B-8DAE-1953F412C126}" type="datetimeFigureOut">
               <a:rPr lang="en-US" smtClean="0"/>
-              <a:t>3/29/2018</a:t>
+              <a:t>3/30/2018</a:t>
             </a:fld>
             <a:endParaRPr lang="en-US" dirty="0"/>
           </a:p>
@@ -2786,7 +2787,7 @@
           <a:p>
             <a:fld id="{48A87A34-81AB-432B-8DAE-1953F412C126}" type="datetimeFigureOut">
               <a:rPr lang="en-US" smtClean="0"/>
-              <a:t>3/29/2018</a:t>
+              <a:t>3/30/2018</a:t>
             </a:fld>
             <a:endParaRPr lang="en-US" dirty="0"/>
           </a:p>
@@ -2957,7 +2958,7 @@
           <a:p>
             <a:fld id="{48A87A34-81AB-432B-8DAE-1953F412C126}" type="datetimeFigureOut">
               <a:rPr lang="en-US" smtClean="0"/>
-              <a:t>3/29/2018</a:t>
+              <a:t>3/30/2018</a:t>
             </a:fld>
             <a:endParaRPr lang="en-US" dirty="0"/>
           </a:p>
@@ -3311,7 +3312,7 @@
           <a:p>
             <a:fld id="{48A87A34-81AB-432B-8DAE-1953F412C126}" type="datetimeFigureOut">
               <a:rPr lang="en-US" smtClean="0"/>
-              <a:t>3/29/2018</a:t>
+              <a:t>3/30/2018</a:t>
             </a:fld>
             <a:endParaRPr lang="en-US" dirty="0"/>
           </a:p>
@@ -3688,7 +3689,7 @@
           <a:p>
             <a:fld id="{48A87A34-81AB-432B-8DAE-1953F412C126}" type="datetimeFigureOut">
               <a:rPr lang="en-US" smtClean="0"/>
-              <a:t>3/29/2018</a:t>
+              <a:t>3/30/2018</a:t>
             </a:fld>
             <a:endParaRPr lang="en-US" dirty="0"/>
           </a:p>
@@ -3976,7 +3977,7 @@
             <a:fld id="{48A87A34-81AB-432B-8DAE-1953F412C126}" type="datetimeFigureOut">
               <a:rPr lang="en-US" smtClean="0"/>
               <a:pPr/>
-              <a:t>3/29/2018</a:t>
+              <a:t>3/30/2018</a:t>
             </a:fld>
             <a:endParaRPr lang="en-US" dirty="0"/>
           </a:p>
@@ -4561,9 +4562,9 @@
           <a:lstStyle/>
           <a:p>
             <a:r>
-              <a:rPr lang="EN-US">
+              <a:rPr lang="EN-US" dirty="0">
                 <a:solidFill>
-                  <a:srgbClr val="FFFFFF"/>
+                  <a:schemeClr val="tx1"/>
                 </a:solidFill>
               </a:rPr>
               <a:t>For Development and Production</a:t>
@@ -5586,6 +5587,97 @@
 </file>
 
 <file path=ppt/slides/slide6.xml><?xml version="1.0" encoding="utf-8"?>
+<p:sld xmlns:a="http://schemas.openxmlformats.org/drawingml/2006/main" xmlns:r="http://schemas.openxmlformats.org/officeDocument/2006/relationships" xmlns:p="http://schemas.openxmlformats.org/presentationml/2006/main">
+  <p:cSld>
+    <p:spTree>
+      <p:nvGrpSpPr>
+        <p:cNvPr id="1" name=""/>
+        <p:cNvGrpSpPr/>
+        <p:nvPr/>
+      </p:nvGrpSpPr>
+      <p:grpSpPr>
+        <a:xfrm>
+          <a:off x="0" y="0"/>
+          <a:ext cx="0" cy="0"/>
+          <a:chOff x="0" y="0"/>
+          <a:chExt cx="0" cy="0"/>
+        </a:xfrm>
+      </p:grpSpPr>
+      <p:sp>
+        <p:nvSpPr>
+          <p:cNvPr id="2" name="Title 1">
+            <a:extLst>
+              <a:ext uri="{FF2B5EF4-FFF2-40B4-BE49-F238E27FC236}">
+                <a16:creationId xmlns:a16="http://schemas.microsoft.com/office/drawing/2014/main" id="{AFC01FAF-819F-4B7C-A9EB-CBD4C7C66298}"/>
+              </a:ext>
+            </a:extLst>
+          </p:cNvPr>
+          <p:cNvSpPr>
+            <a:spLocks noGrp="1"/>
+          </p:cNvSpPr>
+          <p:nvPr>
+            <p:ph type="title"/>
+          </p:nvPr>
+        </p:nvSpPr>
+        <p:spPr/>
+        <p:txBody>
+          <a:bodyPr/>
+          <a:lstStyle/>
+          <a:p>
+            <a:r>
+              <a:rPr lang="en-US" dirty="0"/>
+              <a:t>Get The Code</a:t>
+            </a:r>
+          </a:p>
+        </p:txBody>
+      </p:sp>
+      <p:sp>
+        <p:nvSpPr>
+          <p:cNvPr id="3" name="Content Placeholder 2">
+            <a:extLst>
+              <a:ext uri="{FF2B5EF4-FFF2-40B4-BE49-F238E27FC236}">
+                <a16:creationId xmlns:a16="http://schemas.microsoft.com/office/drawing/2014/main" id="{EE490796-E655-4C46-A21C-27AEE0461D8D}"/>
+              </a:ext>
+            </a:extLst>
+          </p:cNvPr>
+          <p:cNvSpPr>
+            <a:spLocks noGrp="1"/>
+          </p:cNvSpPr>
+          <p:nvPr>
+            <p:ph idx="1"/>
+          </p:nvPr>
+        </p:nvSpPr>
+        <p:spPr/>
+        <p:txBody>
+          <a:bodyPr>
+            <a:normAutofit/>
+          </a:bodyPr>
+          <a:lstStyle/>
+          <a:p>
+            <a:pPr marL="0" indent="0">
+              <a:buNone/>
+            </a:pPr>
+            <a:r>
+              <a:rPr lang="en-US" sz="2800" dirty="0"/>
+              <a:t>https://github.com/ClaytonHunt/UsingDockerForDevAndProd</a:t>
+            </a:r>
+          </a:p>
+        </p:txBody>
+      </p:sp>
+    </p:spTree>
+    <p:extLst>
+      <p:ext uri="{BB962C8B-B14F-4D97-AF65-F5344CB8AC3E}">
+        <p14:creationId xmlns:p14="http://schemas.microsoft.com/office/powerpoint/2010/main" val="772028282"/>
+      </p:ext>
+    </p:extLst>
+  </p:cSld>
+  <p:clrMapOvr>
+    <a:masterClrMapping/>
+  </p:clrMapOvr>
+</p:sld>
+</file>
+
+<file path=ppt/slides/slide7.xml><?xml version="1.0" encoding="utf-8"?>
 <p:sld xmlns:a="http://schemas.openxmlformats.org/drawingml/2006/main" xmlns:r="http://schemas.openxmlformats.org/officeDocument/2006/relationships" xmlns:p="http://schemas.openxmlformats.org/presentationml/2006/main">
   <p:cSld>
     <p:bg>

</xml_diff>